<commit_message>
Ls 5 videos and presentation
</commit_message>
<xml_diff>
--- a/lesson 5/Lesson_5.pptx
+++ b/lesson 5/Lesson_5.pptx
@@ -5,7 +5,7 @@
     <p:sldMasterId id="2147483648" r:id="rId1"/>
   </p:sldMasterIdLst>
   <p:notesMasterIdLst>
-    <p:notesMasterId r:id="rId17"/>
+    <p:notesMasterId r:id="rId11"/>
   </p:notesMasterIdLst>
   <p:sldIdLst>
     <p:sldId id="256" r:id="rId2"/>
@@ -17,12 +17,6 @@
     <p:sldId id="281" r:id="rId8"/>
     <p:sldId id="283" r:id="rId9"/>
     <p:sldId id="284" r:id="rId10"/>
-    <p:sldId id="276" r:id="rId11"/>
-    <p:sldId id="265" r:id="rId12"/>
-    <p:sldId id="274" r:id="rId13"/>
-    <p:sldId id="277" r:id="rId14"/>
-    <p:sldId id="275" r:id="rId15"/>
-    <p:sldId id="278" r:id="rId16"/>
   </p:sldIdLst>
   <p:sldSz cx="12192000" cy="6858000"/>
   <p:notesSz cx="6858000" cy="9144000"/>
@@ -135,7 +129,7 @@
     <p1510:client id="{0C6B8EF6-F8A4-7AB8-7F88-BD27EDEFE434}" v="2" dt="2021-12-02T05:38:51.155"/>
     <p1510:client id="{1D00F415-21C9-126B-D811-EECC4BD1021F}" v="336" dt="2021-12-08T16:55:26.595"/>
     <p1510:client id="{58A5EECA-69F4-A2C6-FD0E-DB58BAABE3E1}" v="170" dt="2021-12-08T11:52:11.015"/>
-    <p1510:client id="{74933E90-46F3-E64A-66B3-628E104D7037}" v="1624" dt="2021-12-14T10:03:35.350"/>
+    <p1510:client id="{74933E90-46F3-E64A-66B3-628E104D7037}" v="1630" dt="2021-12-15T04:35:50.659"/>
     <p1510:client id="{8D6854E7-4F17-FE40-59D2-55336647B245}" v="392" dt="2021-12-08T17:31:06.388"/>
     <p1510:client id="{C89ACF45-C2F8-E76F-58EF-8272F11558CB}" v="235" dt="2021-12-02T10:05:05.975"/>
     <p1510:client id="{E143B352-6C6B-8238-531D-573B4674CE9C}" v="2349" dt="2021-12-07T09:23:16.743"/>
@@ -4594,2493 +4588,6 @@
     <p:extLst>
       <p:ext uri="{BB962C8B-B14F-4D97-AF65-F5344CB8AC3E}">
         <p14:creationId xmlns:p14="http://schemas.microsoft.com/office/powerpoint/2010/main" val="1831159771"/>
-      </p:ext>
-    </p:extLst>
-  </p:cSld>
-  <p:clrMapOvr>
-    <a:masterClrMapping/>
-  </p:clrMapOvr>
-</p:sld>
-</file>
-
-<file path=ppt/slides/slide10.xml><?xml version="1.0" encoding="utf-8"?>
-<p:sld xmlns:a="http://schemas.openxmlformats.org/drawingml/2006/main" xmlns:r="http://schemas.openxmlformats.org/officeDocument/2006/relationships" xmlns:p="http://schemas.openxmlformats.org/presentationml/2006/main">
-  <p:cSld>
-    <p:spTree>
-      <p:nvGrpSpPr>
-        <p:cNvPr id="1" name=""/>
-        <p:cNvGrpSpPr/>
-        <p:nvPr/>
-      </p:nvGrpSpPr>
-      <p:grpSpPr>
-        <a:xfrm>
-          <a:off x="0" y="0"/>
-          <a:ext cx="0" cy="0"/>
-          <a:chOff x="0" y="0"/>
-          <a:chExt cx="0" cy="0"/>
-        </a:xfrm>
-      </p:grpSpPr>
-      <p:sp>
-        <p:nvSpPr>
-          <p:cNvPr id="3" name="Прямоугольник 4">
-            <a:extLst>
-              <a:ext uri="{FF2B5EF4-FFF2-40B4-BE49-F238E27FC236}">
-                <a16:creationId xmlns:a16="http://schemas.microsoft.com/office/drawing/2014/main" id="{36CC0B9C-0EBE-4A1E-B58D-B636BD15693B}"/>
-              </a:ext>
-            </a:extLst>
-          </p:cNvPr>
-          <p:cNvSpPr/>
-          <p:nvPr/>
-        </p:nvSpPr>
-        <p:spPr>
-          <a:xfrm>
-            <a:off x="569167" y="242596"/>
-            <a:ext cx="11150082" cy="811763"/>
-          </a:xfrm>
-          <a:prstGeom prst="rect">
-            <a:avLst/>
-          </a:prstGeom>
-        </p:spPr>
-        <p:style>
-          <a:lnRef idx="2">
-            <a:schemeClr val="accent1">
-              <a:shade val="50000"/>
-            </a:schemeClr>
-          </a:lnRef>
-          <a:fillRef idx="1">
-            <a:schemeClr val="accent1"/>
-          </a:fillRef>
-          <a:effectRef idx="0">
-            <a:schemeClr val="accent1"/>
-          </a:effectRef>
-          <a:fontRef idx="minor">
-            <a:schemeClr val="lt1"/>
-          </a:fontRef>
-        </p:style>
-        <p:txBody>
-          <a:bodyPr lIns="91440" tIns="45720" rIns="91440" bIns="45720" rtlCol="0" anchor="ctr"/>
-          <a:lstStyle/>
-          <a:p>
-            <a:pPr algn="ctr"/>
-            <a:r>
-              <a:rPr lang="ru-RU" sz="3200" b="1" dirty="0">
-                <a:ln w="12700" cmpd="sng">
-                  <a:solidFill>
-                    <a:srgbClr val="FFC000"/>
-                  </a:solidFill>
-                  <a:prstDash val="solid"/>
-                </a:ln>
-                <a:solidFill>
-                  <a:srgbClr val="FFC000"/>
-                </a:solidFill>
-                <a:cs typeface="Calibri"/>
-              </a:rPr>
-              <a:t>Пример функции</a:t>
-            </a:r>
-            <a:endParaRPr lang="en-US" dirty="0"/>
-          </a:p>
-        </p:txBody>
-      </p:sp>
-      <p:sp>
-        <p:nvSpPr>
-          <p:cNvPr id="5" name="Rectangle: Rounded Corners 4">
-            <a:extLst>
-              <a:ext uri="{FF2B5EF4-FFF2-40B4-BE49-F238E27FC236}">
-                <a16:creationId xmlns:a16="http://schemas.microsoft.com/office/drawing/2014/main" id="{345097A7-3DDA-42EE-B1B5-948D82531DB4}"/>
-              </a:ext>
-            </a:extLst>
-          </p:cNvPr>
-          <p:cNvSpPr/>
-          <p:nvPr/>
-        </p:nvSpPr>
-        <p:spPr>
-          <a:xfrm>
-            <a:off x="1609104" y="4775016"/>
-            <a:ext cx="9847382" cy="1543538"/>
-          </a:xfrm>
-          <a:prstGeom prst="roundRect">
-            <a:avLst/>
-          </a:prstGeom>
-        </p:spPr>
-        <p:style>
-          <a:lnRef idx="2">
-            <a:schemeClr val="accent1">
-              <a:shade val="50000"/>
-            </a:schemeClr>
-          </a:lnRef>
-          <a:fillRef idx="1">
-            <a:schemeClr val="accent1"/>
-          </a:fillRef>
-          <a:effectRef idx="0">
-            <a:schemeClr val="accent1"/>
-          </a:effectRef>
-          <a:fontRef idx="minor">
-            <a:schemeClr val="lt1"/>
-          </a:fontRef>
-        </p:style>
-        <p:txBody>
-          <a:bodyPr lIns="91440" tIns="45720" rIns="91440" bIns="45720" rtlCol="0" anchor="ctr"/>
-          <a:lstStyle/>
-          <a:p>
-            <a:r>
-              <a:rPr lang="en-US" dirty="0">
-                <a:ea typeface="+mn-lt"/>
-                <a:cs typeface="+mn-lt"/>
-              </a:rPr>
-              <a:t>     </a:t>
-            </a:r>
-            <a:r>
-              <a:rPr lang="en-US" dirty="0" err="1">
-                <a:solidFill>
-                  <a:schemeClr val="accent4"/>
-                </a:solidFill>
-                <a:ea typeface="+mn-lt"/>
-                <a:cs typeface="+mn-lt"/>
-              </a:rPr>
-              <a:t>Функции</a:t>
-            </a:r>
-            <a:r>
-              <a:rPr lang="en-US" dirty="0">
-                <a:solidFill>
-                  <a:schemeClr val="accent4"/>
-                </a:solidFill>
-                <a:ea typeface="+mn-lt"/>
-                <a:cs typeface="+mn-lt"/>
-              </a:rPr>
-              <a:t> </a:t>
-            </a:r>
-            <a:r>
-              <a:rPr lang="en-US" dirty="0" err="1">
-                <a:ea typeface="+mn-lt"/>
-                <a:cs typeface="+mn-lt"/>
-              </a:rPr>
-              <a:t>определяются</a:t>
-            </a:r>
-            <a:r>
-              <a:rPr lang="en-US" dirty="0">
-                <a:ea typeface="+mn-lt"/>
-                <a:cs typeface="+mn-lt"/>
-              </a:rPr>
-              <a:t> </a:t>
-            </a:r>
-            <a:r>
-              <a:rPr lang="en-US" dirty="0" err="1">
-                <a:ea typeface="+mn-lt"/>
-                <a:cs typeface="+mn-lt"/>
-              </a:rPr>
-              <a:t>при</a:t>
-            </a:r>
-            <a:r>
-              <a:rPr lang="en-US" dirty="0">
-                <a:ea typeface="+mn-lt"/>
-                <a:cs typeface="+mn-lt"/>
-              </a:rPr>
-              <a:t> </a:t>
-            </a:r>
-            <a:r>
-              <a:rPr lang="en-US" dirty="0" err="1">
-                <a:ea typeface="+mn-lt"/>
-                <a:cs typeface="+mn-lt"/>
-              </a:rPr>
-              <a:t>помощи</a:t>
-            </a:r>
-            <a:r>
-              <a:rPr lang="en-US" dirty="0">
-                <a:ea typeface="+mn-lt"/>
-                <a:cs typeface="+mn-lt"/>
-              </a:rPr>
-              <a:t> </a:t>
-            </a:r>
-            <a:r>
-              <a:rPr lang="en-US" dirty="0" err="1">
-                <a:ea typeface="+mn-lt"/>
-                <a:cs typeface="+mn-lt"/>
-              </a:rPr>
-              <a:t>зарезервированного</a:t>
-            </a:r>
-            <a:r>
-              <a:rPr lang="en-US" dirty="0">
-                <a:ea typeface="+mn-lt"/>
-                <a:cs typeface="+mn-lt"/>
-              </a:rPr>
-              <a:t> </a:t>
-            </a:r>
-            <a:r>
-              <a:rPr lang="en-US" dirty="0" err="1">
-                <a:ea typeface="+mn-lt"/>
-                <a:cs typeface="+mn-lt"/>
-              </a:rPr>
-              <a:t>слова</a:t>
-            </a:r>
-            <a:r>
-              <a:rPr lang="en-US" dirty="0">
-                <a:ea typeface="+mn-lt"/>
-                <a:cs typeface="+mn-lt"/>
-              </a:rPr>
-              <a:t> </a:t>
-            </a:r>
-            <a:r>
-              <a:rPr lang="en-US" dirty="0">
-                <a:solidFill>
-                  <a:schemeClr val="accent4"/>
-                </a:solidFill>
-                <a:ea typeface="+mn-lt"/>
-                <a:cs typeface="+mn-lt"/>
-              </a:rPr>
-              <a:t>def </a:t>
-            </a:r>
-            <a:r>
-              <a:rPr lang="en-US" dirty="0">
-                <a:ea typeface="+mn-lt"/>
-                <a:cs typeface="+mn-lt"/>
-              </a:rPr>
-              <a:t>. </a:t>
-            </a:r>
-            <a:r>
-              <a:rPr lang="en-US" dirty="0" err="1">
-                <a:ea typeface="+mn-lt"/>
-                <a:cs typeface="+mn-lt"/>
-              </a:rPr>
-              <a:t>После</a:t>
-            </a:r>
-            <a:r>
-              <a:rPr lang="en-US" dirty="0">
-                <a:ea typeface="+mn-lt"/>
-                <a:cs typeface="+mn-lt"/>
-              </a:rPr>
-              <a:t> </a:t>
-            </a:r>
-            <a:r>
-              <a:rPr lang="en-US" dirty="0" err="1">
-                <a:ea typeface="+mn-lt"/>
-                <a:cs typeface="+mn-lt"/>
-              </a:rPr>
-              <a:t>этого</a:t>
-            </a:r>
-            <a:r>
-              <a:rPr lang="en-US" dirty="0">
-                <a:ea typeface="+mn-lt"/>
-                <a:cs typeface="+mn-lt"/>
-              </a:rPr>
-              <a:t> </a:t>
-            </a:r>
-            <a:r>
-              <a:rPr lang="en-US" dirty="0" err="1">
-                <a:ea typeface="+mn-lt"/>
-                <a:cs typeface="+mn-lt"/>
-              </a:rPr>
-              <a:t>слова</a:t>
-            </a:r>
-            <a:endParaRPr lang="en-US" dirty="0" err="1"/>
-          </a:p>
-          <a:p>
-            <a:r>
-              <a:rPr lang="en-US" dirty="0" err="1">
-                <a:ea typeface="+mn-lt"/>
-                <a:cs typeface="+mn-lt"/>
-              </a:rPr>
-              <a:t>указывается</a:t>
-            </a:r>
-            <a:r>
-              <a:rPr lang="en-US" dirty="0">
-                <a:ea typeface="+mn-lt"/>
-                <a:cs typeface="+mn-lt"/>
-              </a:rPr>
-              <a:t> </a:t>
-            </a:r>
-            <a:r>
-              <a:rPr lang="en-US" dirty="0" err="1">
-                <a:ea typeface="+mn-lt"/>
-                <a:cs typeface="+mn-lt"/>
-              </a:rPr>
-              <a:t>имя</a:t>
-            </a:r>
-            <a:r>
-              <a:rPr lang="en-US" dirty="0">
-                <a:ea typeface="+mn-lt"/>
-                <a:cs typeface="+mn-lt"/>
-              </a:rPr>
-              <a:t> </a:t>
-            </a:r>
-            <a:r>
-              <a:rPr lang="en-US" dirty="0" err="1">
-                <a:ea typeface="+mn-lt"/>
-                <a:cs typeface="+mn-lt"/>
-              </a:rPr>
-              <a:t>функции</a:t>
-            </a:r>
-            <a:r>
-              <a:rPr lang="en-US" dirty="0">
-                <a:ea typeface="+mn-lt"/>
-                <a:cs typeface="+mn-lt"/>
-              </a:rPr>
-              <a:t>, </a:t>
-            </a:r>
-            <a:r>
-              <a:rPr lang="en-US" dirty="0" err="1">
-                <a:ea typeface="+mn-lt"/>
-                <a:cs typeface="+mn-lt"/>
-              </a:rPr>
-              <a:t>за</a:t>
-            </a:r>
-            <a:r>
-              <a:rPr lang="en-US" dirty="0">
-                <a:ea typeface="+mn-lt"/>
-                <a:cs typeface="+mn-lt"/>
-              </a:rPr>
-              <a:t> </a:t>
-            </a:r>
-            <a:r>
-              <a:rPr lang="en-US" dirty="0" err="1">
-                <a:ea typeface="+mn-lt"/>
-                <a:cs typeface="+mn-lt"/>
-              </a:rPr>
-              <a:t>которым</a:t>
-            </a:r>
-            <a:r>
-              <a:rPr lang="en-US" dirty="0">
-                <a:ea typeface="+mn-lt"/>
-                <a:cs typeface="+mn-lt"/>
-              </a:rPr>
-              <a:t> </a:t>
-            </a:r>
-            <a:r>
-              <a:rPr lang="en-US" dirty="0" err="1">
-                <a:ea typeface="+mn-lt"/>
-                <a:cs typeface="+mn-lt"/>
-              </a:rPr>
-              <a:t>следует</a:t>
-            </a:r>
-            <a:r>
-              <a:rPr lang="en-US" dirty="0">
-                <a:ea typeface="+mn-lt"/>
-                <a:cs typeface="+mn-lt"/>
-              </a:rPr>
-              <a:t> </a:t>
-            </a:r>
-            <a:r>
-              <a:rPr lang="en-US" dirty="0" err="1">
-                <a:ea typeface="+mn-lt"/>
-                <a:cs typeface="+mn-lt"/>
-              </a:rPr>
-              <a:t>пара</a:t>
-            </a:r>
-            <a:r>
-              <a:rPr lang="en-US" dirty="0">
-                <a:ea typeface="+mn-lt"/>
-                <a:cs typeface="+mn-lt"/>
-              </a:rPr>
-              <a:t> </a:t>
-            </a:r>
-            <a:r>
-              <a:rPr lang="en-US" dirty="0" err="1">
-                <a:ea typeface="+mn-lt"/>
-                <a:cs typeface="+mn-lt"/>
-              </a:rPr>
-              <a:t>скобок</a:t>
-            </a:r>
-            <a:r>
-              <a:rPr lang="en-US" dirty="0">
-                <a:ea typeface="+mn-lt"/>
-                <a:cs typeface="+mn-lt"/>
-              </a:rPr>
-              <a:t>, в </a:t>
-            </a:r>
-            <a:r>
-              <a:rPr lang="en-US" dirty="0" err="1">
-                <a:ea typeface="+mn-lt"/>
-                <a:cs typeface="+mn-lt"/>
-              </a:rPr>
-              <a:t>которых</a:t>
-            </a:r>
-            <a:r>
-              <a:rPr lang="en-US" dirty="0">
-                <a:ea typeface="+mn-lt"/>
-                <a:cs typeface="+mn-lt"/>
-              </a:rPr>
-              <a:t> </a:t>
-            </a:r>
-            <a:r>
-              <a:rPr lang="en-US" dirty="0" err="1">
-                <a:ea typeface="+mn-lt"/>
-                <a:cs typeface="+mn-lt"/>
-              </a:rPr>
-              <a:t>можно</a:t>
-            </a:r>
-            <a:r>
-              <a:rPr lang="en-US" dirty="0">
-                <a:ea typeface="+mn-lt"/>
-                <a:cs typeface="+mn-lt"/>
-              </a:rPr>
-              <a:t> </a:t>
-            </a:r>
-            <a:r>
-              <a:rPr lang="en-US" dirty="0" err="1">
-                <a:ea typeface="+mn-lt"/>
-                <a:cs typeface="+mn-lt"/>
-              </a:rPr>
-              <a:t>указать</a:t>
-            </a:r>
-            <a:endParaRPr lang="en-US" dirty="0" err="1"/>
-          </a:p>
-          <a:p>
-            <a:r>
-              <a:rPr lang="en-US" dirty="0" err="1">
-                <a:ea typeface="+mn-lt"/>
-                <a:cs typeface="+mn-lt"/>
-              </a:rPr>
-              <a:t>имена</a:t>
-            </a:r>
-            <a:r>
-              <a:rPr lang="en-US" dirty="0">
-                <a:ea typeface="+mn-lt"/>
-                <a:cs typeface="+mn-lt"/>
-              </a:rPr>
-              <a:t> </a:t>
-            </a:r>
-            <a:r>
-              <a:rPr lang="en-US" dirty="0" err="1">
-                <a:ea typeface="+mn-lt"/>
-                <a:cs typeface="+mn-lt"/>
-              </a:rPr>
-              <a:t>некоторых</a:t>
-            </a:r>
-            <a:r>
-              <a:rPr lang="en-US" dirty="0">
-                <a:ea typeface="+mn-lt"/>
-                <a:cs typeface="+mn-lt"/>
-              </a:rPr>
-              <a:t> </a:t>
-            </a:r>
-            <a:r>
-              <a:rPr lang="en-US" dirty="0" err="1">
-                <a:ea typeface="+mn-lt"/>
-                <a:cs typeface="+mn-lt"/>
-              </a:rPr>
-              <a:t>переменных</a:t>
-            </a:r>
-            <a:r>
-              <a:rPr lang="en-US" dirty="0">
-                <a:ea typeface="+mn-lt"/>
-                <a:cs typeface="+mn-lt"/>
-              </a:rPr>
-              <a:t>, и </a:t>
-            </a:r>
-            <a:r>
-              <a:rPr lang="en-US" dirty="0" err="1">
-                <a:ea typeface="+mn-lt"/>
-                <a:cs typeface="+mn-lt"/>
-              </a:rPr>
-              <a:t>заключительное</a:t>
-            </a:r>
-            <a:r>
-              <a:rPr lang="en-US" dirty="0">
-                <a:ea typeface="+mn-lt"/>
-                <a:cs typeface="+mn-lt"/>
-              </a:rPr>
-              <a:t> </a:t>
-            </a:r>
-            <a:r>
-              <a:rPr lang="en-US" dirty="0" err="1">
-                <a:ea typeface="+mn-lt"/>
-                <a:cs typeface="+mn-lt"/>
-              </a:rPr>
-              <a:t>двоеточие</a:t>
-            </a:r>
-            <a:r>
-              <a:rPr lang="en-US" dirty="0">
-                <a:ea typeface="+mn-lt"/>
-                <a:cs typeface="+mn-lt"/>
-              </a:rPr>
-              <a:t> в </a:t>
-            </a:r>
-            <a:r>
-              <a:rPr lang="en-US" dirty="0" err="1">
-                <a:ea typeface="+mn-lt"/>
-                <a:cs typeface="+mn-lt"/>
-              </a:rPr>
-              <a:t>конце</a:t>
-            </a:r>
-            <a:r>
-              <a:rPr lang="en-US" dirty="0">
-                <a:ea typeface="+mn-lt"/>
-                <a:cs typeface="+mn-lt"/>
-              </a:rPr>
-              <a:t> </a:t>
-            </a:r>
-            <a:r>
-              <a:rPr lang="en-US" dirty="0" err="1">
-                <a:ea typeface="+mn-lt"/>
-                <a:cs typeface="+mn-lt"/>
-              </a:rPr>
-              <a:t>строки</a:t>
-            </a:r>
-            <a:endParaRPr lang="en-US" dirty="0" err="1"/>
-          </a:p>
-        </p:txBody>
-      </p:sp>
-      <p:pic>
-        <p:nvPicPr>
-          <p:cNvPr id="2" name="Picture 6">
-            <a:extLst>
-              <a:ext uri="{FF2B5EF4-FFF2-40B4-BE49-F238E27FC236}">
-                <a16:creationId xmlns:a16="http://schemas.microsoft.com/office/drawing/2014/main" id="{FF2370DA-4E3C-4AFF-8BD1-05C22AC3B50C}"/>
-              </a:ext>
-            </a:extLst>
-          </p:cNvPr>
-          <p:cNvPicPr>
-            <a:picLocks noChangeAspect="1"/>
-          </p:cNvPicPr>
-          <p:nvPr/>
-        </p:nvPicPr>
-        <p:blipFill>
-          <a:blip r:embed="rId2"/>
-          <a:stretch>
-            <a:fillRect/>
-          </a:stretch>
-        </p:blipFill>
-        <p:spPr>
-          <a:xfrm>
-            <a:off x="4187092" y="2524223"/>
-            <a:ext cx="4179276" cy="1125707"/>
-          </a:xfrm>
-          <a:prstGeom prst="rect">
-            <a:avLst/>
-          </a:prstGeom>
-        </p:spPr>
-      </p:pic>
-    </p:spTree>
-    <p:extLst>
-      <p:ext uri="{BB962C8B-B14F-4D97-AF65-F5344CB8AC3E}">
-        <p14:creationId xmlns:p14="http://schemas.microsoft.com/office/powerpoint/2010/main" val="3527025613"/>
-      </p:ext>
-    </p:extLst>
-  </p:cSld>
-  <p:clrMapOvr>
-    <a:masterClrMapping/>
-  </p:clrMapOvr>
-</p:sld>
-</file>
-
-<file path=ppt/slides/slide11.xml><?xml version="1.0" encoding="utf-8"?>
-<p:sld xmlns:a="http://schemas.openxmlformats.org/drawingml/2006/main" xmlns:r="http://schemas.openxmlformats.org/officeDocument/2006/relationships" xmlns:p="http://schemas.openxmlformats.org/presentationml/2006/main">
-  <p:cSld>
-    <p:spTree>
-      <p:nvGrpSpPr>
-        <p:cNvPr id="1" name=""/>
-        <p:cNvGrpSpPr/>
-        <p:nvPr/>
-      </p:nvGrpSpPr>
-      <p:grpSpPr>
-        <a:xfrm>
-          <a:off x="0" y="0"/>
-          <a:ext cx="0" cy="0"/>
-          <a:chOff x="0" y="0"/>
-          <a:chExt cx="0" cy="0"/>
-        </a:xfrm>
-      </p:grpSpPr>
-      <p:sp>
-        <p:nvSpPr>
-          <p:cNvPr id="3" name="Прямоугольник 4">
-            <a:extLst>
-              <a:ext uri="{FF2B5EF4-FFF2-40B4-BE49-F238E27FC236}">
-                <a16:creationId xmlns:a16="http://schemas.microsoft.com/office/drawing/2014/main" id="{36CC0B9C-0EBE-4A1E-B58D-B636BD15693B}"/>
-              </a:ext>
-            </a:extLst>
-          </p:cNvPr>
-          <p:cNvSpPr/>
-          <p:nvPr/>
-        </p:nvSpPr>
-        <p:spPr>
-          <a:xfrm>
-            <a:off x="569167" y="242596"/>
-            <a:ext cx="11150082" cy="811763"/>
-          </a:xfrm>
-          <a:prstGeom prst="rect">
-            <a:avLst/>
-          </a:prstGeom>
-        </p:spPr>
-        <p:style>
-          <a:lnRef idx="2">
-            <a:schemeClr val="accent1">
-              <a:shade val="50000"/>
-            </a:schemeClr>
-          </a:lnRef>
-          <a:fillRef idx="1">
-            <a:schemeClr val="accent1"/>
-          </a:fillRef>
-          <a:effectRef idx="0">
-            <a:schemeClr val="accent1"/>
-          </a:effectRef>
-          <a:fontRef idx="minor">
-            <a:schemeClr val="lt1"/>
-          </a:fontRef>
-        </p:style>
-        <p:txBody>
-          <a:bodyPr lIns="91440" tIns="45720" rIns="91440" bIns="45720" rtlCol="0" anchor="ctr"/>
-          <a:lstStyle/>
-          <a:p>
-            <a:pPr algn="ctr"/>
-            <a:r>
-              <a:rPr lang="ru-RU" sz="3200" b="1" dirty="0">
-                <a:ln w="12700" cmpd="sng">
-                  <a:solidFill>
-                    <a:srgbClr val="FFC000"/>
-                  </a:solidFill>
-                  <a:prstDash val="solid"/>
-                </a:ln>
-                <a:solidFill>
-                  <a:srgbClr val="FFC000"/>
-                </a:solidFill>
-                <a:ea typeface="+mn-lt"/>
-                <a:cs typeface="+mn-lt"/>
-              </a:rPr>
-              <a:t>Параметры функций</a:t>
-            </a:r>
-            <a:endParaRPr lang="ru-RU" sz="3200" b="1" dirty="0">
-              <a:ln w="12700" cmpd="sng">
-                <a:solidFill>
-                  <a:srgbClr val="FFC000"/>
-                </a:solidFill>
-                <a:prstDash val="solid"/>
-              </a:ln>
-              <a:solidFill>
-                <a:srgbClr val="FFC000"/>
-              </a:solidFill>
-              <a:cs typeface="Calibri"/>
-            </a:endParaRPr>
-          </a:p>
-        </p:txBody>
-      </p:sp>
-      <p:sp>
-        <p:nvSpPr>
-          <p:cNvPr id="5" name="Rectangle: Rounded Corners 4">
-            <a:extLst>
-              <a:ext uri="{FF2B5EF4-FFF2-40B4-BE49-F238E27FC236}">
-                <a16:creationId xmlns:a16="http://schemas.microsoft.com/office/drawing/2014/main" id="{345097A7-3DDA-42EE-B1B5-948D82531DB4}"/>
-              </a:ext>
-            </a:extLst>
-          </p:cNvPr>
-          <p:cNvSpPr/>
-          <p:nvPr/>
-        </p:nvSpPr>
-        <p:spPr>
-          <a:xfrm>
-            <a:off x="1609104" y="4775016"/>
-            <a:ext cx="9075613" cy="1348154"/>
-          </a:xfrm>
-          <a:prstGeom prst="roundRect">
-            <a:avLst/>
-          </a:prstGeom>
-        </p:spPr>
-        <p:style>
-          <a:lnRef idx="2">
-            <a:schemeClr val="accent1">
-              <a:shade val="50000"/>
-            </a:schemeClr>
-          </a:lnRef>
-          <a:fillRef idx="1">
-            <a:schemeClr val="accent1"/>
-          </a:fillRef>
-          <a:effectRef idx="0">
-            <a:schemeClr val="accent1"/>
-          </a:effectRef>
-          <a:fontRef idx="minor">
-            <a:schemeClr val="lt1"/>
-          </a:fontRef>
-        </p:style>
-        <p:txBody>
-          <a:bodyPr lIns="91440" tIns="45720" rIns="91440" bIns="45720" rtlCol="0" anchor="ctr"/>
-          <a:lstStyle/>
-          <a:p>
-            <a:r>
-              <a:rPr lang="en-US" dirty="0">
-                <a:ea typeface="+mn-lt"/>
-                <a:cs typeface="+mn-lt"/>
-              </a:rPr>
-              <a:t>   </a:t>
-            </a:r>
-          </a:p>
-        </p:txBody>
-      </p:sp>
-      <p:pic>
-        <p:nvPicPr>
-          <p:cNvPr id="4" name="Picture 5">
-            <a:extLst>
-              <a:ext uri="{FF2B5EF4-FFF2-40B4-BE49-F238E27FC236}">
-                <a16:creationId xmlns:a16="http://schemas.microsoft.com/office/drawing/2014/main" id="{5F8F02EB-D289-4B07-9F3B-44FBAA17AD46}"/>
-              </a:ext>
-            </a:extLst>
-          </p:cNvPr>
-          <p:cNvPicPr>
-            <a:picLocks noChangeAspect="1"/>
-          </p:cNvPicPr>
-          <p:nvPr/>
-        </p:nvPicPr>
-        <p:blipFill>
-          <a:blip r:embed="rId2"/>
-          <a:stretch>
-            <a:fillRect/>
-          </a:stretch>
-        </p:blipFill>
-        <p:spPr>
-          <a:xfrm>
-            <a:off x="3288323" y="1931002"/>
-            <a:ext cx="5390661" cy="2116765"/>
-          </a:xfrm>
-          <a:prstGeom prst="rect">
-            <a:avLst/>
-          </a:prstGeom>
-        </p:spPr>
-      </p:pic>
-    </p:spTree>
-    <p:extLst>
-      <p:ext uri="{BB962C8B-B14F-4D97-AF65-F5344CB8AC3E}">
-        <p14:creationId xmlns:p14="http://schemas.microsoft.com/office/powerpoint/2010/main" val="2236230769"/>
-      </p:ext>
-    </p:extLst>
-  </p:cSld>
-  <p:clrMapOvr>
-    <a:masterClrMapping/>
-  </p:clrMapOvr>
-</p:sld>
-</file>
-
-<file path=ppt/slides/slide12.xml><?xml version="1.0" encoding="utf-8"?>
-<p:sld xmlns:a="http://schemas.openxmlformats.org/drawingml/2006/main" xmlns:r="http://schemas.openxmlformats.org/officeDocument/2006/relationships" xmlns:p="http://schemas.openxmlformats.org/presentationml/2006/main">
-  <p:cSld>
-    <p:spTree>
-      <p:nvGrpSpPr>
-        <p:cNvPr id="1" name=""/>
-        <p:cNvGrpSpPr/>
-        <p:nvPr/>
-      </p:nvGrpSpPr>
-      <p:grpSpPr>
-        <a:xfrm>
-          <a:off x="0" y="0"/>
-          <a:ext cx="0" cy="0"/>
-          <a:chOff x="0" y="0"/>
-          <a:chExt cx="0" cy="0"/>
-        </a:xfrm>
-      </p:grpSpPr>
-      <p:sp>
-        <p:nvSpPr>
-          <p:cNvPr id="3" name="Прямоугольник 4">
-            <a:extLst>
-              <a:ext uri="{FF2B5EF4-FFF2-40B4-BE49-F238E27FC236}">
-                <a16:creationId xmlns:a16="http://schemas.microsoft.com/office/drawing/2014/main" id="{36CC0B9C-0EBE-4A1E-B58D-B636BD15693B}"/>
-              </a:ext>
-            </a:extLst>
-          </p:cNvPr>
-          <p:cNvSpPr/>
-          <p:nvPr/>
-        </p:nvSpPr>
-        <p:spPr>
-          <a:xfrm>
-            <a:off x="569167" y="242596"/>
-            <a:ext cx="11150082" cy="811763"/>
-          </a:xfrm>
-          <a:prstGeom prst="rect">
-            <a:avLst/>
-          </a:prstGeom>
-        </p:spPr>
-        <p:style>
-          <a:lnRef idx="2">
-            <a:schemeClr val="accent1">
-              <a:shade val="50000"/>
-            </a:schemeClr>
-          </a:lnRef>
-          <a:fillRef idx="1">
-            <a:schemeClr val="accent1"/>
-          </a:fillRef>
-          <a:effectRef idx="0">
-            <a:schemeClr val="accent1"/>
-          </a:effectRef>
-          <a:fontRef idx="minor">
-            <a:schemeClr val="lt1"/>
-          </a:fontRef>
-        </p:style>
-        <p:txBody>
-          <a:bodyPr lIns="91440" tIns="45720" rIns="91440" bIns="45720" rtlCol="0" anchor="ctr"/>
-          <a:lstStyle/>
-          <a:p>
-            <a:pPr algn="ctr"/>
-            <a:r>
-              <a:rPr lang="ru-RU" sz="3200" b="1" dirty="0">
-                <a:ln w="12700" cmpd="sng">
-                  <a:solidFill>
-                    <a:srgbClr val="FFC000"/>
-                  </a:solidFill>
-                  <a:prstDash val="solid"/>
-                </a:ln>
-                <a:solidFill>
-                  <a:srgbClr val="FFC000"/>
-                </a:solidFill>
-                <a:cs typeface="Calibri"/>
-              </a:rPr>
-              <a:t>Ключевые аргументы</a:t>
-            </a:r>
-          </a:p>
-        </p:txBody>
-      </p:sp>
-      <p:sp>
-        <p:nvSpPr>
-          <p:cNvPr id="5" name="Rectangle: Rounded Corners 4">
-            <a:extLst>
-              <a:ext uri="{FF2B5EF4-FFF2-40B4-BE49-F238E27FC236}">
-                <a16:creationId xmlns:a16="http://schemas.microsoft.com/office/drawing/2014/main" id="{345097A7-3DDA-42EE-B1B5-948D82531DB4}"/>
-              </a:ext>
-            </a:extLst>
-          </p:cNvPr>
-          <p:cNvSpPr/>
-          <p:nvPr/>
-        </p:nvSpPr>
-        <p:spPr>
-          <a:xfrm>
-            <a:off x="1179258" y="4794554"/>
-            <a:ext cx="9837613" cy="1484923"/>
-          </a:xfrm>
-          <a:prstGeom prst="roundRect">
-            <a:avLst/>
-          </a:prstGeom>
-        </p:spPr>
-        <p:style>
-          <a:lnRef idx="2">
-            <a:schemeClr val="accent1">
-              <a:shade val="50000"/>
-            </a:schemeClr>
-          </a:lnRef>
-          <a:fillRef idx="1">
-            <a:schemeClr val="accent1"/>
-          </a:fillRef>
-          <a:effectRef idx="0">
-            <a:schemeClr val="accent1"/>
-          </a:effectRef>
-          <a:fontRef idx="minor">
-            <a:schemeClr val="lt1"/>
-          </a:fontRef>
-        </p:style>
-        <p:txBody>
-          <a:bodyPr lIns="91440" tIns="45720" rIns="91440" bIns="45720" rtlCol="0" anchor="ctr"/>
-          <a:lstStyle/>
-          <a:p>
-            <a:r>
-              <a:rPr lang="en-US" dirty="0">
-                <a:solidFill>
-                  <a:schemeClr val="accent4"/>
-                </a:solidFill>
-                <a:ea typeface="+mn-lt"/>
-                <a:cs typeface="+mn-lt"/>
-              </a:rPr>
-              <a:t>     </a:t>
-            </a:r>
-            <a:r>
-              <a:rPr lang="en-US" dirty="0" err="1">
-                <a:ea typeface="+mn-lt"/>
-                <a:cs typeface="+mn-lt"/>
-              </a:rPr>
-              <a:t>Если</a:t>
-            </a:r>
-            <a:r>
-              <a:rPr lang="en-US" dirty="0">
-                <a:ea typeface="+mn-lt"/>
-                <a:cs typeface="+mn-lt"/>
-              </a:rPr>
-              <a:t> </a:t>
-            </a:r>
-            <a:r>
-              <a:rPr lang="en-US" dirty="0" err="1">
-                <a:ea typeface="+mn-lt"/>
-                <a:cs typeface="+mn-lt"/>
-              </a:rPr>
-              <a:t>имеется</a:t>
-            </a:r>
-            <a:r>
-              <a:rPr lang="en-US" dirty="0">
-                <a:ea typeface="+mn-lt"/>
-                <a:cs typeface="+mn-lt"/>
-              </a:rPr>
-              <a:t> </a:t>
-            </a:r>
-            <a:r>
-              <a:rPr lang="en-US" dirty="0" err="1">
-                <a:ea typeface="+mn-lt"/>
-                <a:cs typeface="+mn-lt"/>
-              </a:rPr>
-              <a:t>некоторая</a:t>
-            </a:r>
-            <a:r>
-              <a:rPr lang="en-US" dirty="0">
-                <a:ea typeface="+mn-lt"/>
-                <a:cs typeface="+mn-lt"/>
-              </a:rPr>
-              <a:t> </a:t>
-            </a:r>
-            <a:r>
-              <a:rPr lang="en-US" dirty="0" err="1">
-                <a:ea typeface="+mn-lt"/>
-                <a:cs typeface="+mn-lt"/>
-              </a:rPr>
-              <a:t>функция</a:t>
-            </a:r>
-            <a:r>
-              <a:rPr lang="en-US" dirty="0">
-                <a:ea typeface="+mn-lt"/>
-                <a:cs typeface="+mn-lt"/>
-              </a:rPr>
-              <a:t> с </a:t>
-            </a:r>
-            <a:r>
-              <a:rPr lang="en-US" dirty="0" err="1">
-                <a:ea typeface="+mn-lt"/>
-                <a:cs typeface="+mn-lt"/>
-              </a:rPr>
-              <a:t>большим</a:t>
-            </a:r>
-            <a:r>
-              <a:rPr lang="en-US" dirty="0">
-                <a:ea typeface="+mn-lt"/>
-                <a:cs typeface="+mn-lt"/>
-              </a:rPr>
-              <a:t> </a:t>
-            </a:r>
-            <a:r>
-              <a:rPr lang="en-US" dirty="0" err="1">
-                <a:ea typeface="+mn-lt"/>
-                <a:cs typeface="+mn-lt"/>
-              </a:rPr>
-              <a:t>числом</a:t>
-            </a:r>
-            <a:r>
-              <a:rPr lang="en-US" dirty="0">
-                <a:ea typeface="+mn-lt"/>
-                <a:cs typeface="+mn-lt"/>
-              </a:rPr>
-              <a:t> </a:t>
-            </a:r>
-            <a:r>
-              <a:rPr lang="en-US" dirty="0" err="1">
-                <a:ea typeface="+mn-lt"/>
-                <a:cs typeface="+mn-lt"/>
-              </a:rPr>
-              <a:t>параметров</a:t>
-            </a:r>
-            <a:r>
-              <a:rPr lang="en-US" dirty="0">
-                <a:ea typeface="+mn-lt"/>
-                <a:cs typeface="+mn-lt"/>
-              </a:rPr>
-              <a:t>, и </a:t>
-            </a:r>
-            <a:r>
-              <a:rPr lang="en-US" dirty="0" err="1">
-                <a:ea typeface="+mn-lt"/>
-                <a:cs typeface="+mn-lt"/>
-              </a:rPr>
-              <a:t>при</a:t>
-            </a:r>
-            <a:r>
-              <a:rPr lang="en-US" dirty="0">
-                <a:ea typeface="+mn-lt"/>
-                <a:cs typeface="+mn-lt"/>
-              </a:rPr>
-              <a:t> </a:t>
-            </a:r>
-            <a:r>
-              <a:rPr lang="en-US" dirty="0" err="1">
-                <a:ea typeface="+mn-lt"/>
-                <a:cs typeface="+mn-lt"/>
-              </a:rPr>
-              <a:t>её</a:t>
-            </a:r>
-            <a:r>
-              <a:rPr lang="en-US" dirty="0">
-                <a:ea typeface="+mn-lt"/>
-                <a:cs typeface="+mn-lt"/>
-              </a:rPr>
-              <a:t> </a:t>
-            </a:r>
-            <a:r>
-              <a:rPr lang="en-US" dirty="0" err="1">
-                <a:ea typeface="+mn-lt"/>
-                <a:cs typeface="+mn-lt"/>
-              </a:rPr>
-              <a:t>вызове</a:t>
-            </a:r>
-            <a:r>
-              <a:rPr lang="en-US" dirty="0">
-                <a:ea typeface="+mn-lt"/>
-                <a:cs typeface="+mn-lt"/>
-              </a:rPr>
-              <a:t> </a:t>
-            </a:r>
-            <a:r>
-              <a:rPr lang="en-US" dirty="0" err="1">
-                <a:ea typeface="+mn-lt"/>
-                <a:cs typeface="+mn-lt"/>
-              </a:rPr>
-              <a:t>тре</a:t>
-            </a:r>
-            <a:r>
-              <a:rPr lang="en-US" dirty="0">
-                <a:ea typeface="+mn-lt"/>
-                <a:cs typeface="+mn-lt"/>
-              </a:rPr>
-              <a:t>-</a:t>
-            </a:r>
-            <a:endParaRPr lang="en-US" dirty="0" err="1">
-              <a:ea typeface="+mn-lt"/>
-              <a:cs typeface="+mn-lt"/>
-            </a:endParaRPr>
-          </a:p>
-          <a:p>
-            <a:r>
-              <a:rPr lang="en-US" dirty="0" err="1">
-                <a:ea typeface="+mn-lt"/>
-                <a:cs typeface="+mn-lt"/>
-              </a:rPr>
-              <a:t>буется</a:t>
-            </a:r>
-            <a:r>
-              <a:rPr lang="en-US" dirty="0">
-                <a:ea typeface="+mn-lt"/>
-                <a:cs typeface="+mn-lt"/>
-              </a:rPr>
-              <a:t> </a:t>
-            </a:r>
-            <a:r>
-              <a:rPr lang="en-US" dirty="0" err="1">
-                <a:ea typeface="+mn-lt"/>
-                <a:cs typeface="+mn-lt"/>
-              </a:rPr>
-              <a:t>указать</a:t>
-            </a:r>
-            <a:r>
-              <a:rPr lang="en-US" dirty="0">
-                <a:ea typeface="+mn-lt"/>
-                <a:cs typeface="+mn-lt"/>
-              </a:rPr>
-              <a:t> </a:t>
-            </a:r>
-            <a:r>
-              <a:rPr lang="en-US" dirty="0" err="1">
-                <a:ea typeface="+mn-lt"/>
-                <a:cs typeface="+mn-lt"/>
-              </a:rPr>
-              <a:t>только</a:t>
-            </a:r>
-            <a:r>
-              <a:rPr lang="en-US" dirty="0">
-                <a:ea typeface="+mn-lt"/>
-                <a:cs typeface="+mn-lt"/>
-              </a:rPr>
-              <a:t> </a:t>
-            </a:r>
-            <a:r>
-              <a:rPr lang="en-US" dirty="0" err="1">
-                <a:ea typeface="+mn-lt"/>
-                <a:cs typeface="+mn-lt"/>
-              </a:rPr>
-              <a:t>некоторые</a:t>
-            </a:r>
-            <a:r>
-              <a:rPr lang="en-US" dirty="0">
-                <a:ea typeface="+mn-lt"/>
-                <a:cs typeface="+mn-lt"/>
-              </a:rPr>
-              <a:t> </a:t>
-            </a:r>
-            <a:r>
-              <a:rPr lang="en-US" dirty="0" err="1">
-                <a:ea typeface="+mn-lt"/>
-                <a:cs typeface="+mn-lt"/>
-              </a:rPr>
-              <a:t>из</a:t>
-            </a:r>
-            <a:r>
-              <a:rPr lang="en-US" dirty="0">
-                <a:ea typeface="+mn-lt"/>
-                <a:cs typeface="+mn-lt"/>
-              </a:rPr>
-              <a:t> </a:t>
-            </a:r>
-            <a:r>
-              <a:rPr lang="en-US" dirty="0" err="1">
-                <a:ea typeface="+mn-lt"/>
-                <a:cs typeface="+mn-lt"/>
-              </a:rPr>
-              <a:t>них</a:t>
-            </a:r>
-            <a:r>
-              <a:rPr lang="en-US" dirty="0">
-                <a:ea typeface="+mn-lt"/>
-                <a:cs typeface="+mn-lt"/>
-              </a:rPr>
-              <a:t>, </a:t>
-            </a:r>
-            <a:r>
-              <a:rPr lang="en-US" dirty="0" err="1">
-                <a:ea typeface="+mn-lt"/>
-                <a:cs typeface="+mn-lt"/>
-              </a:rPr>
-              <a:t>значения</a:t>
-            </a:r>
-            <a:r>
-              <a:rPr lang="en-US" dirty="0">
-                <a:ea typeface="+mn-lt"/>
-                <a:cs typeface="+mn-lt"/>
-              </a:rPr>
-              <a:t> </a:t>
-            </a:r>
-            <a:r>
-              <a:rPr lang="en-US" dirty="0" err="1">
-                <a:ea typeface="+mn-lt"/>
-                <a:cs typeface="+mn-lt"/>
-              </a:rPr>
-              <a:t>этих</a:t>
-            </a:r>
-            <a:r>
-              <a:rPr lang="en-US" dirty="0">
-                <a:ea typeface="+mn-lt"/>
-                <a:cs typeface="+mn-lt"/>
-              </a:rPr>
-              <a:t> </a:t>
-            </a:r>
-            <a:r>
-              <a:rPr lang="en-US" dirty="0" err="1">
-                <a:ea typeface="+mn-lt"/>
-                <a:cs typeface="+mn-lt"/>
-              </a:rPr>
-              <a:t>параметров</a:t>
-            </a:r>
-            <a:r>
-              <a:rPr lang="en-US" dirty="0">
-                <a:ea typeface="+mn-lt"/>
-                <a:cs typeface="+mn-lt"/>
-              </a:rPr>
-              <a:t> </a:t>
-            </a:r>
-            <a:r>
-              <a:rPr lang="en-US" dirty="0" err="1">
-                <a:ea typeface="+mn-lt"/>
-                <a:cs typeface="+mn-lt"/>
-              </a:rPr>
-              <a:t>могут</a:t>
-            </a:r>
-            <a:r>
-              <a:rPr lang="en-US" dirty="0">
-                <a:ea typeface="+mn-lt"/>
-                <a:cs typeface="+mn-lt"/>
-              </a:rPr>
-              <a:t> </a:t>
-            </a:r>
-            <a:r>
-              <a:rPr lang="en-US" dirty="0" err="1">
-                <a:ea typeface="+mn-lt"/>
-                <a:cs typeface="+mn-lt"/>
-              </a:rPr>
-              <a:t>задаваться</a:t>
-            </a:r>
-            <a:r>
-              <a:rPr lang="en-US" dirty="0">
-                <a:ea typeface="+mn-lt"/>
-                <a:cs typeface="+mn-lt"/>
-              </a:rPr>
-              <a:t> </a:t>
-            </a:r>
-            <a:r>
-              <a:rPr lang="en-US" dirty="0" err="1">
-                <a:ea typeface="+mn-lt"/>
-                <a:cs typeface="+mn-lt"/>
-              </a:rPr>
-              <a:t>по</a:t>
-            </a:r>
-            <a:endParaRPr lang="en-US" dirty="0" err="1"/>
-          </a:p>
-          <a:p>
-            <a:r>
-              <a:rPr lang="en-US" dirty="0" err="1">
-                <a:ea typeface="+mn-lt"/>
-                <a:cs typeface="+mn-lt"/>
-              </a:rPr>
-              <a:t>их</a:t>
-            </a:r>
-            <a:r>
-              <a:rPr lang="en-US" dirty="0">
-                <a:ea typeface="+mn-lt"/>
-                <a:cs typeface="+mn-lt"/>
-              </a:rPr>
-              <a:t> </a:t>
-            </a:r>
-            <a:r>
-              <a:rPr lang="en-US" dirty="0" err="1">
-                <a:ea typeface="+mn-lt"/>
-                <a:cs typeface="+mn-lt"/>
-              </a:rPr>
-              <a:t>имени</a:t>
-            </a:r>
-            <a:r>
-              <a:rPr lang="en-US" dirty="0">
-                <a:ea typeface="+mn-lt"/>
-                <a:cs typeface="+mn-lt"/>
-              </a:rPr>
-              <a:t> – </a:t>
-            </a:r>
-            <a:r>
-              <a:rPr lang="en-US" dirty="0" err="1">
-                <a:ea typeface="+mn-lt"/>
-                <a:cs typeface="+mn-lt"/>
-              </a:rPr>
-              <a:t>это</a:t>
-            </a:r>
-            <a:r>
-              <a:rPr lang="en-US" dirty="0">
-                <a:ea typeface="+mn-lt"/>
-                <a:cs typeface="+mn-lt"/>
-              </a:rPr>
-              <a:t> </a:t>
-            </a:r>
-            <a:r>
-              <a:rPr lang="en-US" dirty="0" err="1">
-                <a:ea typeface="+mn-lt"/>
-                <a:cs typeface="+mn-lt"/>
-              </a:rPr>
-              <a:t>называется</a:t>
-            </a:r>
-            <a:r>
-              <a:rPr lang="en-US" dirty="0">
-                <a:ea typeface="+mn-lt"/>
-                <a:cs typeface="+mn-lt"/>
-              </a:rPr>
-              <a:t> </a:t>
-            </a:r>
-            <a:r>
-              <a:rPr lang="en-US" dirty="0" err="1">
-                <a:solidFill>
-                  <a:schemeClr val="accent4"/>
-                </a:solidFill>
-                <a:ea typeface="+mn-lt"/>
-                <a:cs typeface="+mn-lt"/>
-              </a:rPr>
-              <a:t>ключевые</a:t>
-            </a:r>
-            <a:r>
-              <a:rPr lang="en-US" dirty="0">
-                <a:solidFill>
-                  <a:schemeClr val="accent4"/>
-                </a:solidFill>
-                <a:ea typeface="+mn-lt"/>
-                <a:cs typeface="+mn-lt"/>
-              </a:rPr>
-              <a:t> </a:t>
-            </a:r>
-            <a:r>
-              <a:rPr lang="en-US" dirty="0" err="1">
-                <a:solidFill>
-                  <a:schemeClr val="accent4"/>
-                </a:solidFill>
-                <a:ea typeface="+mn-lt"/>
-                <a:cs typeface="+mn-lt"/>
-              </a:rPr>
-              <a:t>параметры</a:t>
-            </a:r>
-            <a:r>
-              <a:rPr lang="en-US" dirty="0">
-                <a:ea typeface="+mn-lt"/>
-                <a:cs typeface="+mn-lt"/>
-              </a:rPr>
-              <a:t>. В </a:t>
-            </a:r>
-            <a:r>
-              <a:rPr lang="en-US" dirty="0" err="1">
-                <a:ea typeface="+mn-lt"/>
-                <a:cs typeface="+mn-lt"/>
-              </a:rPr>
-              <a:t>этом</a:t>
-            </a:r>
-            <a:r>
-              <a:rPr lang="en-US" dirty="0">
-                <a:ea typeface="+mn-lt"/>
-                <a:cs typeface="+mn-lt"/>
-              </a:rPr>
-              <a:t> </a:t>
-            </a:r>
-            <a:r>
-              <a:rPr lang="en-US" dirty="0" err="1">
-                <a:ea typeface="+mn-lt"/>
-                <a:cs typeface="+mn-lt"/>
-              </a:rPr>
-              <a:t>случае</a:t>
-            </a:r>
-            <a:r>
-              <a:rPr lang="en-US" dirty="0">
-                <a:ea typeface="+mn-lt"/>
-                <a:cs typeface="+mn-lt"/>
-              </a:rPr>
-              <a:t> </a:t>
-            </a:r>
-            <a:r>
-              <a:rPr lang="en-US" dirty="0" err="1">
-                <a:ea typeface="+mn-lt"/>
-                <a:cs typeface="+mn-lt"/>
-              </a:rPr>
-              <a:t>для</a:t>
-            </a:r>
-            <a:r>
-              <a:rPr lang="en-US" dirty="0">
-                <a:ea typeface="+mn-lt"/>
-                <a:cs typeface="+mn-lt"/>
-              </a:rPr>
-              <a:t> </a:t>
-            </a:r>
-            <a:r>
-              <a:rPr lang="en-US" dirty="0" err="1">
-                <a:ea typeface="+mn-lt"/>
-                <a:cs typeface="+mn-lt"/>
-              </a:rPr>
-              <a:t>передачи</a:t>
-            </a:r>
-            <a:r>
-              <a:rPr lang="en-US" dirty="0">
-                <a:ea typeface="+mn-lt"/>
-                <a:cs typeface="+mn-lt"/>
-              </a:rPr>
-              <a:t> </a:t>
-            </a:r>
-            <a:r>
-              <a:rPr lang="en-US" dirty="0" err="1">
-                <a:ea typeface="+mn-lt"/>
-                <a:cs typeface="+mn-lt"/>
-              </a:rPr>
-              <a:t>аргументов</a:t>
-            </a:r>
-            <a:endParaRPr lang="en-US" dirty="0" err="1"/>
-          </a:p>
-          <a:p>
-            <a:r>
-              <a:rPr lang="en-US" dirty="0" err="1">
-                <a:ea typeface="+mn-lt"/>
-                <a:cs typeface="+mn-lt"/>
-              </a:rPr>
-              <a:t>функции</a:t>
-            </a:r>
-            <a:r>
-              <a:rPr lang="en-US" dirty="0">
-                <a:ea typeface="+mn-lt"/>
-                <a:cs typeface="+mn-lt"/>
-              </a:rPr>
-              <a:t> </a:t>
-            </a:r>
-            <a:r>
-              <a:rPr lang="en-US" dirty="0" err="1">
-                <a:ea typeface="+mn-lt"/>
-                <a:cs typeface="+mn-lt"/>
-              </a:rPr>
-              <a:t>используется</a:t>
-            </a:r>
-            <a:r>
-              <a:rPr lang="en-US" dirty="0">
-                <a:ea typeface="+mn-lt"/>
-                <a:cs typeface="+mn-lt"/>
-              </a:rPr>
-              <a:t> </a:t>
-            </a:r>
-            <a:r>
-              <a:rPr lang="en-US" dirty="0" err="1">
-                <a:solidFill>
-                  <a:schemeClr val="accent4"/>
-                </a:solidFill>
-                <a:ea typeface="+mn-lt"/>
-                <a:cs typeface="+mn-lt"/>
-              </a:rPr>
-              <a:t>имя</a:t>
-            </a:r>
-            <a:r>
-              <a:rPr lang="en-US" dirty="0">
-                <a:solidFill>
-                  <a:schemeClr val="accent4"/>
-                </a:solidFill>
-                <a:ea typeface="+mn-lt"/>
-                <a:cs typeface="+mn-lt"/>
-              </a:rPr>
-              <a:t> (</a:t>
-            </a:r>
-            <a:r>
-              <a:rPr lang="en-US" dirty="0" err="1">
-                <a:solidFill>
-                  <a:schemeClr val="accent4"/>
-                </a:solidFill>
-                <a:ea typeface="+mn-lt"/>
-                <a:cs typeface="+mn-lt"/>
-              </a:rPr>
-              <a:t>ключ</a:t>
-            </a:r>
-            <a:r>
-              <a:rPr lang="en-US" dirty="0">
-                <a:solidFill>
-                  <a:schemeClr val="accent4"/>
-                </a:solidFill>
-                <a:ea typeface="+mn-lt"/>
-                <a:cs typeface="+mn-lt"/>
-              </a:rPr>
-              <a:t>)</a:t>
-            </a:r>
-            <a:r>
-              <a:rPr lang="en-US" dirty="0">
-                <a:ea typeface="+mn-lt"/>
-                <a:cs typeface="+mn-lt"/>
-              </a:rPr>
-              <a:t> </a:t>
-            </a:r>
-            <a:r>
-              <a:rPr lang="en-US" dirty="0" err="1">
-                <a:ea typeface="+mn-lt"/>
-                <a:cs typeface="+mn-lt"/>
-              </a:rPr>
-              <a:t>вместо</a:t>
-            </a:r>
-            <a:r>
-              <a:rPr lang="en-US" dirty="0">
-                <a:ea typeface="+mn-lt"/>
-                <a:cs typeface="+mn-lt"/>
-              </a:rPr>
-              <a:t> </a:t>
-            </a:r>
-            <a:r>
-              <a:rPr lang="en-US" dirty="0" err="1">
-                <a:ea typeface="+mn-lt"/>
-                <a:cs typeface="+mn-lt"/>
-              </a:rPr>
-              <a:t>позиции</a:t>
-            </a:r>
-            <a:r>
-              <a:rPr lang="en-US" dirty="0">
-                <a:ea typeface="+mn-lt"/>
-                <a:cs typeface="+mn-lt"/>
-              </a:rPr>
-              <a:t> (</a:t>
-            </a:r>
-            <a:r>
-              <a:rPr lang="en-US" dirty="0" err="1">
-                <a:ea typeface="+mn-lt"/>
-                <a:cs typeface="+mn-lt"/>
-              </a:rPr>
-              <a:t>как</a:t>
-            </a:r>
-            <a:r>
-              <a:rPr lang="en-US" dirty="0">
-                <a:ea typeface="+mn-lt"/>
-                <a:cs typeface="+mn-lt"/>
-              </a:rPr>
-              <a:t> </a:t>
-            </a:r>
-            <a:r>
-              <a:rPr lang="en-US" dirty="0" err="1">
-                <a:ea typeface="+mn-lt"/>
-                <a:cs typeface="+mn-lt"/>
-              </a:rPr>
-              <a:t>было</a:t>
-            </a:r>
-            <a:r>
-              <a:rPr lang="en-US" dirty="0">
-                <a:ea typeface="+mn-lt"/>
-                <a:cs typeface="+mn-lt"/>
-              </a:rPr>
-              <a:t> </a:t>
-            </a:r>
-            <a:r>
-              <a:rPr lang="en-US" dirty="0" err="1">
-                <a:ea typeface="+mn-lt"/>
-                <a:cs typeface="+mn-lt"/>
-              </a:rPr>
-              <a:t>до</a:t>
-            </a:r>
-            <a:r>
-              <a:rPr lang="en-US" dirty="0">
-                <a:ea typeface="+mn-lt"/>
-                <a:cs typeface="+mn-lt"/>
-              </a:rPr>
-              <a:t> </a:t>
-            </a:r>
-            <a:r>
-              <a:rPr lang="en-US" dirty="0" err="1">
-                <a:ea typeface="+mn-lt"/>
-                <a:cs typeface="+mn-lt"/>
-              </a:rPr>
-              <a:t>сих</a:t>
-            </a:r>
-            <a:r>
-              <a:rPr lang="en-US" dirty="0">
-                <a:ea typeface="+mn-lt"/>
-                <a:cs typeface="+mn-lt"/>
-              </a:rPr>
-              <a:t> </a:t>
-            </a:r>
-            <a:r>
-              <a:rPr lang="en-US" dirty="0" err="1">
-                <a:ea typeface="+mn-lt"/>
-                <a:cs typeface="+mn-lt"/>
-              </a:rPr>
-              <a:t>пор</a:t>
-            </a:r>
-            <a:r>
-              <a:rPr lang="en-US" dirty="0">
-                <a:ea typeface="+mn-lt"/>
-                <a:cs typeface="+mn-lt"/>
-              </a:rPr>
-              <a:t>).</a:t>
-            </a:r>
-            <a:endParaRPr lang="en-US" dirty="0"/>
-          </a:p>
-        </p:txBody>
-      </p:sp>
-      <p:pic>
-        <p:nvPicPr>
-          <p:cNvPr id="2" name="Picture 5">
-            <a:extLst>
-              <a:ext uri="{FF2B5EF4-FFF2-40B4-BE49-F238E27FC236}">
-                <a16:creationId xmlns:a16="http://schemas.microsoft.com/office/drawing/2014/main" id="{1D6CBB3E-0BF5-4E74-AE1B-BF6D2B5A4779}"/>
-              </a:ext>
-            </a:extLst>
-          </p:cNvPr>
-          <p:cNvPicPr>
-            <a:picLocks noChangeAspect="1"/>
-          </p:cNvPicPr>
-          <p:nvPr/>
-        </p:nvPicPr>
-        <p:blipFill>
-          <a:blip r:embed="rId2"/>
-          <a:stretch>
-            <a:fillRect/>
-          </a:stretch>
-        </p:blipFill>
-        <p:spPr>
-          <a:xfrm>
-            <a:off x="2457938" y="2381932"/>
-            <a:ext cx="6514123" cy="1351675"/>
-          </a:xfrm>
-          <a:prstGeom prst="rect">
-            <a:avLst/>
-          </a:prstGeom>
-        </p:spPr>
-      </p:pic>
-    </p:spTree>
-    <p:extLst>
-      <p:ext uri="{BB962C8B-B14F-4D97-AF65-F5344CB8AC3E}">
-        <p14:creationId xmlns:p14="http://schemas.microsoft.com/office/powerpoint/2010/main" val="3666564438"/>
-      </p:ext>
-    </p:extLst>
-  </p:cSld>
-  <p:clrMapOvr>
-    <a:masterClrMapping/>
-  </p:clrMapOvr>
-</p:sld>
-</file>
-
-<file path=ppt/slides/slide13.xml><?xml version="1.0" encoding="utf-8"?>
-<p:sld xmlns:a="http://schemas.openxmlformats.org/drawingml/2006/main" xmlns:r="http://schemas.openxmlformats.org/officeDocument/2006/relationships" xmlns:p="http://schemas.openxmlformats.org/presentationml/2006/main">
-  <p:cSld>
-    <p:spTree>
-      <p:nvGrpSpPr>
-        <p:cNvPr id="1" name=""/>
-        <p:cNvGrpSpPr/>
-        <p:nvPr/>
-      </p:nvGrpSpPr>
-      <p:grpSpPr>
-        <a:xfrm>
-          <a:off x="0" y="0"/>
-          <a:ext cx="0" cy="0"/>
-          <a:chOff x="0" y="0"/>
-          <a:chExt cx="0" cy="0"/>
-        </a:xfrm>
-      </p:grpSpPr>
-      <p:sp>
-        <p:nvSpPr>
-          <p:cNvPr id="3" name="Прямоугольник 4">
-            <a:extLst>
-              <a:ext uri="{FF2B5EF4-FFF2-40B4-BE49-F238E27FC236}">
-                <a16:creationId xmlns:a16="http://schemas.microsoft.com/office/drawing/2014/main" id="{36CC0B9C-0EBE-4A1E-B58D-B636BD15693B}"/>
-              </a:ext>
-            </a:extLst>
-          </p:cNvPr>
-          <p:cNvSpPr/>
-          <p:nvPr/>
-        </p:nvSpPr>
-        <p:spPr>
-          <a:xfrm>
-            <a:off x="569167" y="242596"/>
-            <a:ext cx="11150082" cy="811763"/>
-          </a:xfrm>
-          <a:prstGeom prst="rect">
-            <a:avLst/>
-          </a:prstGeom>
-        </p:spPr>
-        <p:style>
-          <a:lnRef idx="2">
-            <a:schemeClr val="accent1">
-              <a:shade val="50000"/>
-            </a:schemeClr>
-          </a:lnRef>
-          <a:fillRef idx="1">
-            <a:schemeClr val="accent1"/>
-          </a:fillRef>
-          <a:effectRef idx="0">
-            <a:schemeClr val="accent1"/>
-          </a:effectRef>
-          <a:fontRef idx="minor">
-            <a:schemeClr val="lt1"/>
-          </a:fontRef>
-        </p:style>
-        <p:txBody>
-          <a:bodyPr lIns="91440" tIns="45720" rIns="91440" bIns="45720" rtlCol="0" anchor="ctr"/>
-          <a:lstStyle/>
-          <a:p>
-            <a:pPr algn="ctr"/>
-            <a:r>
-              <a:rPr lang="ru-RU" sz="3200" b="1" dirty="0">
-                <a:ln w="12700" cmpd="sng">
-                  <a:solidFill>
-                    <a:srgbClr val="FFC000"/>
-                  </a:solidFill>
-                  <a:prstDash val="solid"/>
-                </a:ln>
-                <a:solidFill>
-                  <a:srgbClr val="FFC000"/>
-                </a:solidFill>
-                <a:ea typeface="+mn-lt"/>
-                <a:cs typeface="+mn-lt"/>
-              </a:rPr>
-              <a:t>Переменное число параметров</a:t>
-            </a:r>
-            <a:endParaRPr lang="en-US" dirty="0"/>
-          </a:p>
-        </p:txBody>
-      </p:sp>
-      <p:sp>
-        <p:nvSpPr>
-          <p:cNvPr id="5" name="Rectangle: Rounded Corners 4">
-            <a:extLst>
-              <a:ext uri="{FF2B5EF4-FFF2-40B4-BE49-F238E27FC236}">
-                <a16:creationId xmlns:a16="http://schemas.microsoft.com/office/drawing/2014/main" id="{345097A7-3DDA-42EE-B1B5-948D82531DB4}"/>
-              </a:ext>
-            </a:extLst>
-          </p:cNvPr>
-          <p:cNvSpPr/>
-          <p:nvPr/>
-        </p:nvSpPr>
-        <p:spPr>
-          <a:xfrm>
-            <a:off x="7336373" y="1712930"/>
-            <a:ext cx="4093307" cy="2202166"/>
-          </a:xfrm>
-          <a:prstGeom prst="roundRect">
-            <a:avLst/>
-          </a:prstGeom>
-        </p:spPr>
-        <p:style>
-          <a:lnRef idx="2">
-            <a:schemeClr val="accent1">
-              <a:shade val="50000"/>
-            </a:schemeClr>
-          </a:lnRef>
-          <a:fillRef idx="1">
-            <a:schemeClr val="accent1"/>
-          </a:fillRef>
-          <a:effectRef idx="0">
-            <a:schemeClr val="accent1"/>
-          </a:effectRef>
-          <a:fontRef idx="minor">
-            <a:schemeClr val="lt1"/>
-          </a:fontRef>
-        </p:style>
-        <p:txBody>
-          <a:bodyPr lIns="91440" tIns="45720" rIns="91440" bIns="45720" rtlCol="0" anchor="ctr"/>
-          <a:lstStyle/>
-          <a:p>
-            <a:endParaRPr lang="en-US">
-              <a:solidFill>
-                <a:schemeClr val="accent4"/>
-              </a:solidFill>
-              <a:cs typeface="Calibri"/>
-            </a:endParaRPr>
-          </a:p>
-        </p:txBody>
-      </p:sp>
-      <p:sp>
-        <p:nvSpPr>
-          <p:cNvPr id="6" name="Rectangle: Rounded Corners 5">
-            <a:extLst>
-              <a:ext uri="{FF2B5EF4-FFF2-40B4-BE49-F238E27FC236}">
-                <a16:creationId xmlns:a16="http://schemas.microsoft.com/office/drawing/2014/main" id="{D95208DC-342E-437F-9953-0EFB62FD915A}"/>
-              </a:ext>
-            </a:extLst>
-          </p:cNvPr>
-          <p:cNvSpPr/>
-          <p:nvPr/>
-        </p:nvSpPr>
-        <p:spPr>
-          <a:xfrm>
-            <a:off x="2500603" y="5005160"/>
-            <a:ext cx="7102229" cy="1117782"/>
-          </a:xfrm>
-          <a:prstGeom prst="roundRect">
-            <a:avLst/>
-          </a:prstGeom>
-        </p:spPr>
-        <p:style>
-          <a:lnRef idx="2">
-            <a:schemeClr val="accent1">
-              <a:shade val="50000"/>
-            </a:schemeClr>
-          </a:lnRef>
-          <a:fillRef idx="1">
-            <a:schemeClr val="accent1"/>
-          </a:fillRef>
-          <a:effectRef idx="0">
-            <a:schemeClr val="accent1"/>
-          </a:effectRef>
-          <a:fontRef idx="minor">
-            <a:schemeClr val="lt1"/>
-          </a:fontRef>
-        </p:style>
-        <p:txBody>
-          <a:bodyPr lIns="91440" tIns="45720" rIns="91440" bIns="45720" rtlCol="0" anchor="ctr"/>
-          <a:lstStyle/>
-          <a:p>
-            <a:r>
-              <a:rPr lang="en-US" dirty="0">
-                <a:solidFill>
-                  <a:schemeClr val="accent4"/>
-                </a:solidFill>
-                <a:ea typeface="+mn-lt"/>
-                <a:cs typeface="+mn-lt"/>
-              </a:rPr>
-              <a:t>     * </a:t>
-            </a:r>
-            <a:r>
-              <a:rPr lang="en-US" dirty="0">
-                <a:solidFill>
-                  <a:schemeClr val="bg1"/>
-                </a:solidFill>
-                <a:ea typeface="+mn-lt"/>
-                <a:cs typeface="+mn-lt"/>
-              </a:rPr>
-              <a:t>- </a:t>
-            </a:r>
-            <a:r>
-              <a:rPr lang="en-US" dirty="0" err="1">
-                <a:solidFill>
-                  <a:schemeClr val="bg1"/>
-                </a:solidFill>
-                <a:ea typeface="+mn-lt"/>
-                <a:cs typeface="+mn-lt"/>
-              </a:rPr>
-              <a:t>используются</a:t>
-            </a:r>
-            <a:r>
-              <a:rPr lang="en-US" dirty="0">
-                <a:solidFill>
-                  <a:schemeClr val="bg1"/>
-                </a:solidFill>
-                <a:ea typeface="+mn-lt"/>
-                <a:cs typeface="+mn-lt"/>
-              </a:rPr>
-              <a:t> </a:t>
-            </a:r>
-            <a:r>
-              <a:rPr lang="en-US" dirty="0" err="1">
-                <a:solidFill>
-                  <a:schemeClr val="bg1"/>
-                </a:solidFill>
-                <a:ea typeface="+mn-lt"/>
-                <a:cs typeface="+mn-lt"/>
-              </a:rPr>
-              <a:t>для</a:t>
-            </a:r>
-            <a:r>
-              <a:rPr lang="en-US" dirty="0">
-                <a:solidFill>
-                  <a:schemeClr val="bg1"/>
-                </a:solidFill>
-                <a:ea typeface="+mn-lt"/>
-                <a:cs typeface="+mn-lt"/>
-              </a:rPr>
-              <a:t> </a:t>
-            </a:r>
-            <a:r>
-              <a:rPr lang="en-US" dirty="0" err="1">
-                <a:solidFill>
-                  <a:schemeClr val="bg1"/>
-                </a:solidFill>
-                <a:ea typeface="+mn-lt"/>
-                <a:cs typeface="+mn-lt"/>
-              </a:rPr>
-              <a:t>обычных</a:t>
-            </a:r>
-            <a:r>
-              <a:rPr lang="en-US" dirty="0">
-                <a:solidFill>
-                  <a:schemeClr val="bg1"/>
-                </a:solidFill>
-                <a:ea typeface="+mn-lt"/>
-                <a:cs typeface="+mn-lt"/>
-              </a:rPr>
-              <a:t> </a:t>
-            </a:r>
-            <a:r>
-              <a:rPr lang="en-US" dirty="0" err="1">
-                <a:solidFill>
-                  <a:schemeClr val="bg1"/>
-                </a:solidFill>
-                <a:ea typeface="+mn-lt"/>
-                <a:cs typeface="+mn-lt"/>
-              </a:rPr>
-              <a:t>последовательностей</a:t>
-            </a:r>
-            <a:r>
-              <a:rPr lang="en-US" dirty="0">
-                <a:solidFill>
-                  <a:schemeClr val="bg1"/>
-                </a:solidFill>
-                <a:ea typeface="+mn-lt"/>
-                <a:cs typeface="+mn-lt"/>
-              </a:rPr>
-              <a:t>;</a:t>
-            </a:r>
-          </a:p>
-          <a:p>
-            <a:r>
-              <a:rPr lang="en-US" dirty="0">
-                <a:solidFill>
-                  <a:schemeClr val="accent4"/>
-                </a:solidFill>
-                <a:cs typeface="Calibri"/>
-              </a:rPr>
-              <a:t>     ** </a:t>
-            </a:r>
-            <a:r>
-              <a:rPr lang="en-US" dirty="0">
-                <a:solidFill>
-                  <a:schemeClr val="bg1"/>
-                </a:solidFill>
-                <a:cs typeface="Calibri"/>
-              </a:rPr>
-              <a:t>- </a:t>
-            </a:r>
-            <a:r>
-              <a:rPr lang="en-US" dirty="0" err="1">
-                <a:solidFill>
-                  <a:schemeClr val="bg1"/>
-                </a:solidFill>
-                <a:cs typeface="Calibri"/>
-              </a:rPr>
-              <a:t>используются</a:t>
-            </a:r>
-            <a:r>
-              <a:rPr lang="en-US" dirty="0">
-                <a:solidFill>
-                  <a:schemeClr val="bg1"/>
-                </a:solidFill>
-                <a:cs typeface="Calibri"/>
-              </a:rPr>
-              <a:t> </a:t>
-            </a:r>
-            <a:r>
-              <a:rPr lang="en-US" dirty="0" err="1">
-                <a:solidFill>
-                  <a:schemeClr val="bg1"/>
-                </a:solidFill>
-                <a:cs typeface="Calibri"/>
-              </a:rPr>
-              <a:t>для</a:t>
-            </a:r>
-            <a:r>
-              <a:rPr lang="en-US" dirty="0">
-                <a:solidFill>
-                  <a:schemeClr val="bg1"/>
-                </a:solidFill>
-                <a:cs typeface="Calibri"/>
-              </a:rPr>
-              <a:t> </a:t>
-            </a:r>
-            <a:r>
-              <a:rPr lang="en-US" dirty="0" err="1">
-                <a:solidFill>
-                  <a:schemeClr val="bg1"/>
-                </a:solidFill>
-                <a:cs typeface="Calibri"/>
-              </a:rPr>
-              <a:t>последовательностей</a:t>
-            </a:r>
-            <a:r>
-              <a:rPr lang="en-US" dirty="0">
-                <a:solidFill>
-                  <a:schemeClr val="bg1"/>
-                </a:solidFill>
-                <a:cs typeface="Calibri"/>
-              </a:rPr>
-              <a:t> </a:t>
-            </a:r>
-            <a:r>
-              <a:rPr lang="en-US" dirty="0" err="1">
-                <a:solidFill>
-                  <a:schemeClr val="bg1"/>
-                </a:solidFill>
-                <a:cs typeface="Calibri"/>
-              </a:rPr>
-              <a:t>типа</a:t>
-            </a:r>
-            <a:r>
-              <a:rPr lang="en-US" dirty="0">
-                <a:solidFill>
-                  <a:schemeClr val="bg1"/>
-                </a:solidFill>
-                <a:cs typeface="Calibri"/>
-              </a:rPr>
-              <a:t> </a:t>
-            </a:r>
-            <a:r>
-              <a:rPr lang="en-US" dirty="0" err="1">
-                <a:solidFill>
-                  <a:schemeClr val="bg1"/>
-                </a:solidFill>
-                <a:cs typeface="Calibri"/>
-              </a:rPr>
-              <a:t>ключ-значение</a:t>
-            </a:r>
-            <a:r>
-              <a:rPr lang="en-US" dirty="0">
-                <a:solidFill>
-                  <a:schemeClr val="bg1"/>
-                </a:solidFill>
-                <a:cs typeface="Calibri"/>
-              </a:rPr>
-              <a:t>;</a:t>
-            </a:r>
-          </a:p>
-        </p:txBody>
-      </p:sp>
-      <p:pic>
-        <p:nvPicPr>
-          <p:cNvPr id="4" name="Picture 6">
-            <a:extLst>
-              <a:ext uri="{FF2B5EF4-FFF2-40B4-BE49-F238E27FC236}">
-                <a16:creationId xmlns:a16="http://schemas.microsoft.com/office/drawing/2014/main" id="{F3A84122-0F04-43A6-80E4-E07C97C89086}"/>
-              </a:ext>
-            </a:extLst>
-          </p:cNvPr>
-          <p:cNvPicPr>
-            <a:picLocks noChangeAspect="1"/>
-          </p:cNvPicPr>
-          <p:nvPr/>
-        </p:nvPicPr>
-        <p:blipFill>
-          <a:blip r:embed="rId2"/>
-          <a:stretch>
-            <a:fillRect/>
-          </a:stretch>
-        </p:blipFill>
-        <p:spPr>
-          <a:xfrm>
-            <a:off x="826477" y="1660088"/>
-            <a:ext cx="5146430" cy="2531593"/>
-          </a:xfrm>
-          <a:prstGeom prst="rect">
-            <a:avLst/>
-          </a:prstGeom>
-        </p:spPr>
-      </p:pic>
-    </p:spTree>
-    <p:extLst>
-      <p:ext uri="{BB962C8B-B14F-4D97-AF65-F5344CB8AC3E}">
-        <p14:creationId xmlns:p14="http://schemas.microsoft.com/office/powerpoint/2010/main" val="29342022"/>
-      </p:ext>
-    </p:extLst>
-  </p:cSld>
-  <p:clrMapOvr>
-    <a:masterClrMapping/>
-  </p:clrMapOvr>
-</p:sld>
-</file>
-
-<file path=ppt/slides/slide14.xml><?xml version="1.0" encoding="utf-8"?>
-<p:sld xmlns:a="http://schemas.openxmlformats.org/drawingml/2006/main" xmlns:r="http://schemas.openxmlformats.org/officeDocument/2006/relationships" xmlns:p="http://schemas.openxmlformats.org/presentationml/2006/main">
-  <p:cSld>
-    <p:spTree>
-      <p:nvGrpSpPr>
-        <p:cNvPr id="1" name=""/>
-        <p:cNvGrpSpPr/>
-        <p:nvPr/>
-      </p:nvGrpSpPr>
-      <p:grpSpPr>
-        <a:xfrm>
-          <a:off x="0" y="0"/>
-          <a:ext cx="0" cy="0"/>
-          <a:chOff x="0" y="0"/>
-          <a:chExt cx="0" cy="0"/>
-        </a:xfrm>
-      </p:grpSpPr>
-      <p:sp>
-        <p:nvSpPr>
-          <p:cNvPr id="3" name="Прямоугольник 4">
-            <a:extLst>
-              <a:ext uri="{FF2B5EF4-FFF2-40B4-BE49-F238E27FC236}">
-                <a16:creationId xmlns:a16="http://schemas.microsoft.com/office/drawing/2014/main" id="{36CC0B9C-0EBE-4A1E-B58D-B636BD15693B}"/>
-              </a:ext>
-            </a:extLst>
-          </p:cNvPr>
-          <p:cNvSpPr/>
-          <p:nvPr/>
-        </p:nvSpPr>
-        <p:spPr>
-          <a:xfrm>
-            <a:off x="569167" y="242596"/>
-            <a:ext cx="11150082" cy="811763"/>
-          </a:xfrm>
-          <a:prstGeom prst="rect">
-            <a:avLst/>
-          </a:prstGeom>
-        </p:spPr>
-        <p:style>
-          <a:lnRef idx="2">
-            <a:schemeClr val="accent1">
-              <a:shade val="50000"/>
-            </a:schemeClr>
-          </a:lnRef>
-          <a:fillRef idx="1">
-            <a:schemeClr val="accent1"/>
-          </a:fillRef>
-          <a:effectRef idx="0">
-            <a:schemeClr val="accent1"/>
-          </a:effectRef>
-          <a:fontRef idx="minor">
-            <a:schemeClr val="lt1"/>
-          </a:fontRef>
-        </p:style>
-        <p:txBody>
-          <a:bodyPr lIns="91440" tIns="45720" rIns="91440" bIns="45720" rtlCol="0" anchor="ctr"/>
-          <a:lstStyle/>
-          <a:p>
-            <a:pPr algn="ctr"/>
-            <a:r>
-              <a:rPr lang="ru-RU" sz="3200" b="1" dirty="0">
-                <a:ln w="12700" cmpd="sng">
-                  <a:solidFill>
-                    <a:srgbClr val="FFC000"/>
-                  </a:solidFill>
-                  <a:prstDash val="solid"/>
-                </a:ln>
-                <a:solidFill>
-                  <a:srgbClr val="FFC000"/>
-                </a:solidFill>
-                <a:cs typeface="Calibri"/>
-              </a:rPr>
-              <a:t>Оператор </a:t>
-            </a:r>
-            <a:r>
-              <a:rPr lang="ru-RU" sz="3200" b="1" dirty="0" err="1">
-                <a:ln w="12700" cmpd="sng">
-                  <a:solidFill>
-                    <a:srgbClr val="FFC000"/>
-                  </a:solidFill>
-                  <a:prstDash val="solid"/>
-                </a:ln>
-                <a:solidFill>
-                  <a:srgbClr val="FFC000"/>
-                </a:solidFill>
-                <a:cs typeface="Calibri"/>
-              </a:rPr>
-              <a:t>return</a:t>
-            </a:r>
-          </a:p>
-        </p:txBody>
-      </p:sp>
-      <p:sp>
-        <p:nvSpPr>
-          <p:cNvPr id="5" name="Rectangle: Rounded Corners 4">
-            <a:extLst>
-              <a:ext uri="{FF2B5EF4-FFF2-40B4-BE49-F238E27FC236}">
-                <a16:creationId xmlns:a16="http://schemas.microsoft.com/office/drawing/2014/main" id="{345097A7-3DDA-42EE-B1B5-948D82531DB4}"/>
-              </a:ext>
-            </a:extLst>
-          </p:cNvPr>
-          <p:cNvSpPr/>
-          <p:nvPr/>
-        </p:nvSpPr>
-        <p:spPr>
-          <a:xfrm>
-            <a:off x="1521182" y="5019247"/>
-            <a:ext cx="9651997" cy="1113693"/>
-          </a:xfrm>
-          <a:prstGeom prst="roundRect">
-            <a:avLst/>
-          </a:prstGeom>
-        </p:spPr>
-        <p:style>
-          <a:lnRef idx="2">
-            <a:schemeClr val="accent1">
-              <a:shade val="50000"/>
-            </a:schemeClr>
-          </a:lnRef>
-          <a:fillRef idx="1">
-            <a:schemeClr val="accent1"/>
-          </a:fillRef>
-          <a:effectRef idx="0">
-            <a:schemeClr val="accent1"/>
-          </a:effectRef>
-          <a:fontRef idx="minor">
-            <a:schemeClr val="lt1"/>
-          </a:fontRef>
-        </p:style>
-        <p:txBody>
-          <a:bodyPr lIns="91440" tIns="45720" rIns="91440" bIns="45720" rtlCol="0" anchor="ctr"/>
-          <a:lstStyle/>
-          <a:p>
-            <a:r>
-              <a:rPr lang="en-US" dirty="0">
-                <a:solidFill>
-                  <a:schemeClr val="accent4"/>
-                </a:solidFill>
-                <a:ea typeface="+mn-lt"/>
-                <a:cs typeface="+mn-lt"/>
-              </a:rPr>
-              <a:t>     </a:t>
-            </a:r>
-          </a:p>
-        </p:txBody>
-      </p:sp>
-      <p:pic>
-        <p:nvPicPr>
-          <p:cNvPr id="2" name="Picture 3">
-            <a:extLst>
-              <a:ext uri="{FF2B5EF4-FFF2-40B4-BE49-F238E27FC236}">
-                <a16:creationId xmlns:a16="http://schemas.microsoft.com/office/drawing/2014/main" id="{6D0076C2-DF40-468F-A1BA-CF41FEF03F2E}"/>
-              </a:ext>
-            </a:extLst>
-          </p:cNvPr>
-          <p:cNvPicPr>
-            <a:picLocks noChangeAspect="1"/>
-          </p:cNvPicPr>
-          <p:nvPr/>
-        </p:nvPicPr>
-        <p:blipFill>
-          <a:blip r:embed="rId2"/>
-          <a:stretch>
-            <a:fillRect/>
-          </a:stretch>
-        </p:blipFill>
-        <p:spPr>
-          <a:xfrm>
-            <a:off x="3894015" y="1953815"/>
-            <a:ext cx="4599353" cy="2168832"/>
-          </a:xfrm>
-          <a:prstGeom prst="rect">
-            <a:avLst/>
-          </a:prstGeom>
-        </p:spPr>
-      </p:pic>
-    </p:spTree>
-    <p:extLst>
-      <p:ext uri="{BB962C8B-B14F-4D97-AF65-F5344CB8AC3E}">
-        <p14:creationId xmlns:p14="http://schemas.microsoft.com/office/powerpoint/2010/main" val="3288086044"/>
-      </p:ext>
-    </p:extLst>
-  </p:cSld>
-  <p:clrMapOvr>
-    <a:masterClrMapping/>
-  </p:clrMapOvr>
-</p:sld>
-</file>
-
-<file path=ppt/slides/slide15.xml><?xml version="1.0" encoding="utf-8"?>
-<p:sld xmlns:a="http://schemas.openxmlformats.org/drawingml/2006/main" xmlns:r="http://schemas.openxmlformats.org/officeDocument/2006/relationships" xmlns:p="http://schemas.openxmlformats.org/presentationml/2006/main">
-  <p:cSld>
-    <p:spTree>
-      <p:nvGrpSpPr>
-        <p:cNvPr id="1" name=""/>
-        <p:cNvGrpSpPr/>
-        <p:nvPr/>
-      </p:nvGrpSpPr>
-      <p:grpSpPr>
-        <a:xfrm>
-          <a:off x="0" y="0"/>
-          <a:ext cx="0" cy="0"/>
-          <a:chOff x="0" y="0"/>
-          <a:chExt cx="0" cy="0"/>
-        </a:xfrm>
-      </p:grpSpPr>
-      <p:sp>
-        <p:nvSpPr>
-          <p:cNvPr id="3" name="Прямоугольник 4">
-            <a:extLst>
-              <a:ext uri="{FF2B5EF4-FFF2-40B4-BE49-F238E27FC236}">
-                <a16:creationId xmlns:a16="http://schemas.microsoft.com/office/drawing/2014/main" id="{36CC0B9C-0EBE-4A1E-B58D-B636BD15693B}"/>
-              </a:ext>
-            </a:extLst>
-          </p:cNvPr>
-          <p:cNvSpPr/>
-          <p:nvPr/>
-        </p:nvSpPr>
-        <p:spPr>
-          <a:xfrm>
-            <a:off x="569167" y="242596"/>
-            <a:ext cx="11150082" cy="811763"/>
-          </a:xfrm>
-          <a:prstGeom prst="rect">
-            <a:avLst/>
-          </a:prstGeom>
-        </p:spPr>
-        <p:style>
-          <a:lnRef idx="2">
-            <a:schemeClr val="accent1">
-              <a:shade val="50000"/>
-            </a:schemeClr>
-          </a:lnRef>
-          <a:fillRef idx="1">
-            <a:schemeClr val="accent1"/>
-          </a:fillRef>
-          <a:effectRef idx="0">
-            <a:schemeClr val="accent1"/>
-          </a:effectRef>
-          <a:fontRef idx="minor">
-            <a:schemeClr val="lt1"/>
-          </a:fontRef>
-        </p:style>
-        <p:txBody>
-          <a:bodyPr lIns="91440" tIns="45720" rIns="91440" bIns="45720" rtlCol="0" anchor="ctr"/>
-          <a:lstStyle/>
-          <a:p>
-            <a:pPr algn="ctr"/>
-            <a:r>
-              <a:rPr lang="ru-RU" sz="3200" b="1" dirty="0" err="1">
-                <a:ln w="12700" cmpd="sng">
-                  <a:solidFill>
-                    <a:srgbClr val="FFC000"/>
-                  </a:solidFill>
-                  <a:prstDash val="solid"/>
-                </a:ln>
-                <a:solidFill>
-                  <a:srgbClr val="FFC000"/>
-                </a:solidFill>
-                <a:cs typeface="Calibri"/>
-              </a:rPr>
-              <a:t>None</a:t>
-            </a:r>
-            <a:r>
-              <a:rPr lang="ru-RU" sz="3200" b="1" dirty="0">
-                <a:ln w="12700" cmpd="sng">
-                  <a:solidFill>
-                    <a:srgbClr val="FFC000"/>
-                  </a:solidFill>
-                  <a:prstDash val="solid"/>
-                </a:ln>
-                <a:solidFill>
-                  <a:srgbClr val="FFC000"/>
-                </a:solidFill>
-                <a:cs typeface="Calibri"/>
-              </a:rPr>
-              <a:t> и </a:t>
-            </a:r>
-            <a:r>
-              <a:rPr lang="ru-RU" sz="3200" b="1" dirty="0" err="1">
-                <a:ln w="12700" cmpd="sng">
-                  <a:solidFill>
-                    <a:srgbClr val="FFC000"/>
-                  </a:solidFill>
-                  <a:prstDash val="solid"/>
-                </a:ln>
-                <a:solidFill>
-                  <a:srgbClr val="FFC000"/>
-                </a:solidFill>
-                <a:cs typeface="Calibri"/>
-              </a:rPr>
-              <a:t>pass</a:t>
-            </a:r>
-            <a:r>
-              <a:rPr lang="ru-RU" sz="3200" b="1" dirty="0">
-                <a:ln w="12700" cmpd="sng">
-                  <a:solidFill>
-                    <a:srgbClr val="FFC000"/>
-                  </a:solidFill>
-                  <a:prstDash val="solid"/>
-                </a:ln>
-                <a:solidFill>
-                  <a:srgbClr val="FFC000"/>
-                </a:solidFill>
-                <a:cs typeface="Calibri"/>
-              </a:rPr>
-              <a:t> в функциях</a:t>
-            </a:r>
-          </a:p>
-        </p:txBody>
-      </p:sp>
-      <p:sp>
-        <p:nvSpPr>
-          <p:cNvPr id="5" name="Rectangle: Rounded Corners 4">
-            <a:extLst>
-              <a:ext uri="{FF2B5EF4-FFF2-40B4-BE49-F238E27FC236}">
-                <a16:creationId xmlns:a16="http://schemas.microsoft.com/office/drawing/2014/main" id="{345097A7-3DDA-42EE-B1B5-948D82531DB4}"/>
-              </a:ext>
-            </a:extLst>
-          </p:cNvPr>
-          <p:cNvSpPr/>
-          <p:nvPr/>
-        </p:nvSpPr>
-        <p:spPr>
-          <a:xfrm>
-            <a:off x="7128721" y="1766093"/>
-            <a:ext cx="4122613" cy="1113693"/>
-          </a:xfrm>
-          <a:prstGeom prst="roundRect">
-            <a:avLst/>
-          </a:prstGeom>
-        </p:spPr>
-        <p:style>
-          <a:lnRef idx="2">
-            <a:schemeClr val="accent1">
-              <a:shade val="50000"/>
-            </a:schemeClr>
-          </a:lnRef>
-          <a:fillRef idx="1">
-            <a:schemeClr val="accent1"/>
-          </a:fillRef>
-          <a:effectRef idx="0">
-            <a:schemeClr val="accent1"/>
-          </a:effectRef>
-          <a:fontRef idx="minor">
-            <a:schemeClr val="lt1"/>
-          </a:fontRef>
-        </p:style>
-        <p:txBody>
-          <a:bodyPr lIns="91440" tIns="45720" rIns="91440" bIns="45720" rtlCol="0" anchor="ctr"/>
-          <a:lstStyle/>
-          <a:p>
-            <a:endParaRPr lang="en-US" dirty="0" err="1">
-              <a:ea typeface="+mn-lt"/>
-              <a:cs typeface="+mn-lt"/>
-            </a:endParaRPr>
-          </a:p>
-        </p:txBody>
-      </p:sp>
-      <p:pic>
-        <p:nvPicPr>
-          <p:cNvPr id="4" name="Picture 5">
-            <a:extLst>
-              <a:ext uri="{FF2B5EF4-FFF2-40B4-BE49-F238E27FC236}">
-                <a16:creationId xmlns:a16="http://schemas.microsoft.com/office/drawing/2014/main" id="{66FB7525-7629-4FD7-9434-4BCB53A9FC92}"/>
-              </a:ext>
-            </a:extLst>
-          </p:cNvPr>
-          <p:cNvPicPr>
-            <a:picLocks noChangeAspect="1"/>
-          </p:cNvPicPr>
-          <p:nvPr/>
-        </p:nvPicPr>
-        <p:blipFill>
-          <a:blip r:embed="rId2"/>
-          <a:stretch>
-            <a:fillRect/>
-          </a:stretch>
-        </p:blipFill>
-        <p:spPr>
-          <a:xfrm>
-            <a:off x="648677" y="2673229"/>
-            <a:ext cx="5101492" cy="1697159"/>
-          </a:xfrm>
-          <a:prstGeom prst="rect">
-            <a:avLst/>
-          </a:prstGeom>
-        </p:spPr>
-      </p:pic>
-      <p:sp>
-        <p:nvSpPr>
-          <p:cNvPr id="6" name="TextBox 5">
-            <a:extLst>
-              <a:ext uri="{FF2B5EF4-FFF2-40B4-BE49-F238E27FC236}">
-                <a16:creationId xmlns:a16="http://schemas.microsoft.com/office/drawing/2014/main" id="{DABB8DF9-1E64-4EEE-9BC9-2A49AF6CCB93}"/>
-              </a:ext>
-            </a:extLst>
-          </p:cNvPr>
-          <p:cNvSpPr txBox="1"/>
-          <p:nvPr/>
-        </p:nvSpPr>
-        <p:spPr>
-          <a:xfrm>
-            <a:off x="4724400" y="3200400"/>
-            <a:ext cx="2743200" cy="369332"/>
-          </a:xfrm>
-          <a:prstGeom prst="rect">
-            <a:avLst/>
-          </a:prstGeom>
-          <a:noFill/>
-        </p:spPr>
-        <p:txBody>
-          <a:bodyPr rot="0" spcFirstLastPara="0" vertOverflow="overflow" horzOverflow="overflow" vert="horz" wrap="square" lIns="91440" tIns="45720" rIns="91440" bIns="45720" numCol="1" spcCol="0" rtlCol="0" fromWordArt="0" anchor="t" anchorCtr="0" forceAA="0" compatLnSpc="1">
-            <a:prstTxWarp prst="textNoShape">
-              <a:avLst/>
-            </a:prstTxWarp>
-            <a:spAutoFit/>
-          </a:bodyPr>
-          <a:lstStyle/>
-          <a:p>
-            <a:endParaRPr lang="en-US" dirty="0">
-              <a:cs typeface="Calibri"/>
-            </a:endParaRPr>
-          </a:p>
-        </p:txBody>
-      </p:sp>
-      <p:sp>
-        <p:nvSpPr>
-          <p:cNvPr id="7" name="Rectangle: Rounded Corners 6">
-            <a:extLst>
-              <a:ext uri="{FF2B5EF4-FFF2-40B4-BE49-F238E27FC236}">
-                <a16:creationId xmlns:a16="http://schemas.microsoft.com/office/drawing/2014/main" id="{0355EC1E-E4A9-44B2-9C4D-A43352C2746F}"/>
-              </a:ext>
-            </a:extLst>
-          </p:cNvPr>
-          <p:cNvSpPr/>
-          <p:nvPr/>
-        </p:nvSpPr>
-        <p:spPr>
-          <a:xfrm>
-            <a:off x="7128721" y="4394016"/>
-            <a:ext cx="4122613" cy="1113693"/>
-          </a:xfrm>
-          <a:prstGeom prst="roundRect">
-            <a:avLst/>
-          </a:prstGeom>
-        </p:spPr>
-        <p:style>
-          <a:lnRef idx="2">
-            <a:schemeClr val="accent1">
-              <a:shade val="50000"/>
-            </a:schemeClr>
-          </a:lnRef>
-          <a:fillRef idx="1">
-            <a:schemeClr val="accent1"/>
-          </a:fillRef>
-          <a:effectRef idx="0">
-            <a:schemeClr val="accent1"/>
-          </a:effectRef>
-          <a:fontRef idx="minor">
-            <a:schemeClr val="lt1"/>
-          </a:fontRef>
-        </p:style>
-        <p:txBody>
-          <a:bodyPr lIns="91440" tIns="45720" rIns="91440" bIns="45720" rtlCol="0" anchor="ctr"/>
-          <a:lstStyle/>
-          <a:p>
-            <a:endParaRPr lang="en-US" dirty="0">
-              <a:ea typeface="+mn-lt"/>
-              <a:cs typeface="+mn-lt"/>
-            </a:endParaRPr>
-          </a:p>
-        </p:txBody>
-      </p:sp>
-    </p:spTree>
-    <p:extLst>
-      <p:ext uri="{BB962C8B-B14F-4D97-AF65-F5344CB8AC3E}">
-        <p14:creationId xmlns:p14="http://schemas.microsoft.com/office/powerpoint/2010/main" val="751532720"/>
       </p:ext>
     </p:extLst>
   </p:cSld>

</xml_diff>